<commit_message>
minor update on ppt
</commit_message>
<xml_diff>
--- a/others/Vectrofy.pptx
+++ b/others/Vectrofy.pptx
@@ -137,22 +137,6 @@
           <pc:docMk/>
           <pc:sldMk cId="2282108667" sldId="257"/>
         </pc:sldMkLst>
-        <pc:spChg chg="mod">
-          <ac:chgData name="krimy sorathiya" userId="c8748806f1572a9f" providerId="LiveId" clId="{F319521C-9DD0-48FA-8195-9FFA9C84884C}" dt="2024-09-16T14:48:59.269" v="85" actId="2711"/>
-          <ac:spMkLst>
-            <pc:docMk/>
-            <pc:sldMk cId="2282108667" sldId="257"/>
-            <ac:spMk id="3" creationId="{C3E3162F-E14E-761E-4A62-31DFB25FE44E}"/>
-          </ac:spMkLst>
-        </pc:spChg>
-        <pc:spChg chg="mod">
-          <ac:chgData name="krimy sorathiya" userId="c8748806f1572a9f" providerId="LiveId" clId="{F319521C-9DD0-48FA-8195-9FFA9C84884C}" dt="2024-09-16T13:42:19.993" v="47" actId="2711"/>
-          <ac:spMkLst>
-            <pc:docMk/>
-            <pc:sldMk cId="2282108667" sldId="257"/>
-            <ac:spMk id="22" creationId="{0BEC0D2B-E63D-89ED-C71F-59F7764036D8}"/>
-          </ac:spMkLst>
-        </pc:spChg>
       </pc:sldChg>
       <pc:sldChg chg="modSp mod">
         <pc:chgData name="krimy sorathiya" userId="c8748806f1572a9f" providerId="LiveId" clId="{F319521C-9DD0-48FA-8195-9FFA9C84884C}" dt="2024-09-16T14:49:15.454" v="87" actId="2711"/>
@@ -160,22 +144,6 @@
           <pc:docMk/>
           <pc:sldMk cId="2163718111" sldId="258"/>
         </pc:sldMkLst>
-        <pc:spChg chg="mod">
-          <ac:chgData name="krimy sorathiya" userId="c8748806f1572a9f" providerId="LiveId" clId="{F319521C-9DD0-48FA-8195-9FFA9C84884C}" dt="2024-09-16T14:49:15.454" v="87" actId="2711"/>
-          <ac:spMkLst>
-            <pc:docMk/>
-            <pc:sldMk cId="2163718111" sldId="258"/>
-            <ac:spMk id="3" creationId="{C3E3162F-E14E-761E-4A62-31DFB25FE44E}"/>
-          </ac:spMkLst>
-        </pc:spChg>
-        <pc:spChg chg="mod">
-          <ac:chgData name="krimy sorathiya" userId="c8748806f1572a9f" providerId="LiveId" clId="{F319521C-9DD0-48FA-8195-9FFA9C84884C}" dt="2024-09-16T13:42:17.125" v="46" actId="2711"/>
-          <ac:spMkLst>
-            <pc:docMk/>
-            <pc:sldMk cId="2163718111" sldId="258"/>
-            <ac:spMk id="22" creationId="{0BEC0D2B-E63D-89ED-C71F-59F7764036D8}"/>
-          </ac:spMkLst>
-        </pc:spChg>
       </pc:sldChg>
       <pc:sldChg chg="addSp delSp modSp mod">
         <pc:chgData name="krimy sorathiya" userId="c8748806f1572a9f" providerId="LiveId" clId="{F319521C-9DD0-48FA-8195-9FFA9C84884C}" dt="2024-10-13T09:27:41.359" v="1033" actId="1076"/>
@@ -183,46 +151,6 @@
           <pc:docMk/>
           <pc:sldMk cId="2493816262" sldId="259"/>
         </pc:sldMkLst>
-        <pc:spChg chg="add mod">
-          <ac:chgData name="krimy sorathiya" userId="c8748806f1572a9f" providerId="LiveId" clId="{F319521C-9DD0-48FA-8195-9FFA9C84884C}" dt="2024-10-13T09:27:41.359" v="1033" actId="1076"/>
-          <ac:spMkLst>
-            <pc:docMk/>
-            <pc:sldMk cId="2493816262" sldId="259"/>
-            <ac:spMk id="2" creationId="{CD51AAF0-B8F7-56CC-05A1-22106F08C8F7}"/>
-          </ac:spMkLst>
-        </pc:spChg>
-        <pc:spChg chg="del mod">
-          <ac:chgData name="krimy sorathiya" userId="c8748806f1572a9f" providerId="LiveId" clId="{F319521C-9DD0-48FA-8195-9FFA9C84884C}" dt="2024-09-16T13:50:04.706" v="49" actId="478"/>
-          <ac:spMkLst>
-            <pc:docMk/>
-            <pc:sldMk cId="2493816262" sldId="259"/>
-            <ac:spMk id="2" creationId="{F5E97CFF-9F19-5898-D9E9-3D0461107566}"/>
-          </ac:spMkLst>
-        </pc:spChg>
-        <pc:spChg chg="mod">
-          <ac:chgData name="krimy sorathiya" userId="c8748806f1572a9f" providerId="LiveId" clId="{F319521C-9DD0-48FA-8195-9FFA9C84884C}" dt="2024-10-13T08:31:27.409" v="172" actId="2711"/>
-          <ac:spMkLst>
-            <pc:docMk/>
-            <pc:sldMk cId="2493816262" sldId="259"/>
-            <ac:spMk id="3" creationId="{C3E3162F-E14E-761E-4A62-31DFB25FE44E}"/>
-          </ac:spMkLst>
-        </pc:spChg>
-        <pc:spChg chg="mod">
-          <ac:chgData name="krimy sorathiya" userId="c8748806f1572a9f" providerId="LiveId" clId="{F319521C-9DD0-48FA-8195-9FFA9C84884C}" dt="2024-10-13T09:27:35.357" v="1032" actId="1076"/>
-          <ac:spMkLst>
-            <pc:docMk/>
-            <pc:sldMk cId="2493816262" sldId="259"/>
-            <ac:spMk id="11" creationId="{29D62CE0-E87A-8E32-543F-C45A91F09C98}"/>
-          </ac:spMkLst>
-        </pc:spChg>
-        <pc:spChg chg="mod">
-          <ac:chgData name="krimy sorathiya" userId="c8748806f1572a9f" providerId="LiveId" clId="{F319521C-9DD0-48FA-8195-9FFA9C84884C}" dt="2024-09-16T13:42:43.093" v="48" actId="2711"/>
-          <ac:spMkLst>
-            <pc:docMk/>
-            <pc:sldMk cId="2493816262" sldId="259"/>
-            <ac:spMk id="22" creationId="{0BEC0D2B-E63D-89ED-C71F-59F7764036D8}"/>
-          </ac:spMkLst>
-        </pc:spChg>
       </pc:sldChg>
       <pc:sldChg chg="modSp mod">
         <pc:chgData name="krimy sorathiya" userId="c8748806f1572a9f" providerId="LiveId" clId="{F319521C-9DD0-48FA-8195-9FFA9C84884C}" dt="2024-09-16T14:49:21.250" v="88" actId="2711"/>
@@ -230,22 +158,6 @@
           <pc:docMk/>
           <pc:sldMk cId="2556611986" sldId="260"/>
         </pc:sldMkLst>
-        <pc:spChg chg="mod">
-          <ac:chgData name="krimy sorathiya" userId="c8748806f1572a9f" providerId="LiveId" clId="{F319521C-9DD0-48FA-8195-9FFA9C84884C}" dt="2024-09-16T14:49:21.250" v="88" actId="2711"/>
-          <ac:spMkLst>
-            <pc:docMk/>
-            <pc:sldMk cId="2556611986" sldId="260"/>
-            <ac:spMk id="3" creationId="{C3E3162F-E14E-761E-4A62-31DFB25FE44E}"/>
-          </ac:spMkLst>
-        </pc:spChg>
-        <pc:spChg chg="mod">
-          <ac:chgData name="krimy sorathiya" userId="c8748806f1572a9f" providerId="LiveId" clId="{F319521C-9DD0-48FA-8195-9FFA9C84884C}" dt="2024-09-16T13:42:15.291" v="44" actId="2711"/>
-          <ac:spMkLst>
-            <pc:docMk/>
-            <pc:sldMk cId="2556611986" sldId="260"/>
-            <ac:spMk id="22" creationId="{0BEC0D2B-E63D-89ED-C71F-59F7764036D8}"/>
-          </ac:spMkLst>
-        </pc:spChg>
       </pc:sldChg>
       <pc:sldChg chg="modSp mod">
         <pc:chgData name="krimy sorathiya" userId="c8748806f1572a9f" providerId="LiveId" clId="{F319521C-9DD0-48FA-8195-9FFA9C84884C}" dt="2024-09-16T14:49:28.793" v="89" actId="2711"/>
@@ -253,22 +165,6 @@
           <pc:docMk/>
           <pc:sldMk cId="2449377873" sldId="261"/>
         </pc:sldMkLst>
-        <pc:spChg chg="mod">
-          <ac:chgData name="krimy sorathiya" userId="c8748806f1572a9f" providerId="LiveId" clId="{F319521C-9DD0-48FA-8195-9FFA9C84884C}" dt="2024-09-16T14:49:28.793" v="89" actId="2711"/>
-          <ac:spMkLst>
-            <pc:docMk/>
-            <pc:sldMk cId="2449377873" sldId="261"/>
-            <ac:spMk id="3" creationId="{C3E3162F-E14E-761E-4A62-31DFB25FE44E}"/>
-          </ac:spMkLst>
-        </pc:spChg>
-        <pc:spChg chg="mod">
-          <ac:chgData name="krimy sorathiya" userId="c8748806f1572a9f" providerId="LiveId" clId="{F319521C-9DD0-48FA-8195-9FFA9C84884C}" dt="2024-09-16T13:42:15.967" v="45" actId="2711"/>
-          <ac:spMkLst>
-            <pc:docMk/>
-            <pc:sldMk cId="2449377873" sldId="261"/>
-            <ac:spMk id="22" creationId="{0BEC0D2B-E63D-89ED-C71F-59F7764036D8}"/>
-          </ac:spMkLst>
-        </pc:spChg>
       </pc:sldChg>
       <pc:sldChg chg="delSp modSp add mod">
         <pc:chgData name="krimy sorathiya" userId="c8748806f1572a9f" providerId="LiveId" clId="{F319521C-9DD0-48FA-8195-9FFA9C84884C}" dt="2024-10-13T08:28:51.943" v="108" actId="12788"/>
@@ -276,30 +172,6 @@
           <pc:docMk/>
           <pc:sldMk cId="77644946" sldId="262"/>
         </pc:sldMkLst>
-        <pc:spChg chg="del">
-          <ac:chgData name="krimy sorathiya" userId="c8748806f1572a9f" providerId="LiveId" clId="{F319521C-9DD0-48FA-8195-9FFA9C84884C}" dt="2024-10-13T08:28:14.109" v="91" actId="478"/>
-          <ac:spMkLst>
-            <pc:docMk/>
-            <pc:sldMk cId="77644946" sldId="262"/>
-            <ac:spMk id="3" creationId="{3CF5D46E-2678-5557-C9F3-EC897D81F179}"/>
-          </ac:spMkLst>
-        </pc:spChg>
-        <pc:spChg chg="mod">
-          <ac:chgData name="krimy sorathiya" userId="c8748806f1572a9f" providerId="LiveId" clId="{F319521C-9DD0-48FA-8195-9FFA9C84884C}" dt="2024-10-13T08:28:51.943" v="108" actId="12788"/>
-          <ac:spMkLst>
-            <pc:docMk/>
-            <pc:sldMk cId="77644946" sldId="262"/>
-            <ac:spMk id="11" creationId="{61069275-CE76-4BBE-A12D-71B258C6921E}"/>
-          </ac:spMkLst>
-        </pc:spChg>
-        <pc:spChg chg="mod">
-          <ac:chgData name="krimy sorathiya" userId="c8748806f1572a9f" providerId="LiveId" clId="{F319521C-9DD0-48FA-8195-9FFA9C84884C}" dt="2024-10-13T08:28:51.943" v="108" actId="12788"/>
-          <ac:spMkLst>
-            <pc:docMk/>
-            <pc:sldMk cId="77644946" sldId="262"/>
-            <ac:spMk id="22" creationId="{66B0A9AD-B8B7-A40C-E351-58D37CEF1ADB}"/>
-          </ac:spMkLst>
-        </pc:spChg>
       </pc:sldChg>
       <pc:sldChg chg="addSp delSp modSp add mod">
         <pc:chgData name="krimy sorathiya" userId="c8748806f1572a9f" providerId="LiveId" clId="{F319521C-9DD0-48FA-8195-9FFA9C84884C}" dt="2024-10-13T13:35:00.473" v="1102" actId="1036"/>
@@ -307,310 +179,6 @@
           <pc:docMk/>
           <pc:sldMk cId="1082955361" sldId="263"/>
         </pc:sldMkLst>
-        <pc:spChg chg="add del mod">
-          <ac:chgData name="krimy sorathiya" userId="c8748806f1572a9f" providerId="LiveId" clId="{F319521C-9DD0-48FA-8195-9FFA9C84884C}" dt="2024-10-13T08:29:44.319" v="140" actId="478"/>
-          <ac:spMkLst>
-            <pc:docMk/>
-            <pc:sldMk cId="1082955361" sldId="263"/>
-            <ac:spMk id="2" creationId="{3BAAFADB-B25D-039D-EBFB-BB57AB8FB2C8}"/>
-          </ac:spMkLst>
-        </pc:spChg>
-        <pc:spChg chg="add del mod">
-          <ac:chgData name="krimy sorathiya" userId="c8748806f1572a9f" providerId="LiveId" clId="{F319521C-9DD0-48FA-8195-9FFA9C84884C}" dt="2024-10-13T13:34:08.461" v="1093" actId="1076"/>
-          <ac:spMkLst>
-            <pc:docMk/>
-            <pc:sldMk cId="1082955361" sldId="263"/>
-            <ac:spMk id="3" creationId="{99B34458-089B-BA31-2BA8-5AFA5C857220}"/>
-          </ac:spMkLst>
-        </pc:spChg>
-        <pc:spChg chg="add del mod">
-          <ac:chgData name="krimy sorathiya" userId="c8748806f1572a9f" providerId="LiveId" clId="{F319521C-9DD0-48FA-8195-9FFA9C84884C}" dt="2024-10-13T08:29:49.222" v="142" actId="478"/>
-          <ac:spMkLst>
-            <pc:docMk/>
-            <pc:sldMk cId="1082955361" sldId="263"/>
-            <ac:spMk id="5" creationId="{FBECFA84-1BF6-6FB7-6E0D-3B1510E01A3F}"/>
-          </ac:spMkLst>
-        </pc:spChg>
-        <pc:spChg chg="add mod">
-          <ac:chgData name="krimy sorathiya" userId="c8748806f1572a9f" providerId="LiveId" clId="{F319521C-9DD0-48FA-8195-9FFA9C84884C}" dt="2024-10-13T08:30:01.101" v="146" actId="571"/>
-          <ac:spMkLst>
-            <pc:docMk/>
-            <pc:sldMk cId="1082955361" sldId="263"/>
-            <ac:spMk id="6" creationId="{1F55E08A-FB1C-017E-7453-4E7EBDA8DB84}"/>
-          </ac:spMkLst>
-        </pc:spChg>
-        <pc:spChg chg="add del mod">
-          <ac:chgData name="krimy sorathiya" userId="c8748806f1572a9f" providerId="LiveId" clId="{F319521C-9DD0-48FA-8195-9FFA9C84884C}" dt="2024-10-13T08:45:04.003" v="285" actId="478"/>
-          <ac:spMkLst>
-            <pc:docMk/>
-            <pc:sldMk cId="1082955361" sldId="263"/>
-            <ac:spMk id="7" creationId="{2DECC9F0-B00A-36C3-8EBB-3F80F09F9BBD}"/>
-          </ac:spMkLst>
-        </pc:spChg>
-        <pc:spChg chg="add del">
-          <ac:chgData name="krimy sorathiya" userId="c8748806f1572a9f" providerId="LiveId" clId="{F319521C-9DD0-48FA-8195-9FFA9C84884C}" dt="2024-10-13T08:34:44.127" v="196"/>
-          <ac:spMkLst>
-            <pc:docMk/>
-            <pc:sldMk cId="1082955361" sldId="263"/>
-            <ac:spMk id="8" creationId="{9C1202D6-78FC-4676-0561-0F5289FCC9BF}"/>
-          </ac:spMkLst>
-        </pc:spChg>
-        <pc:spChg chg="add del mod">
-          <ac:chgData name="krimy sorathiya" userId="c8748806f1572a9f" providerId="LiveId" clId="{F319521C-9DD0-48FA-8195-9FFA9C84884C}" dt="2024-10-13T08:34:44.127" v="196"/>
-          <ac:spMkLst>
-            <pc:docMk/>
-            <pc:sldMk cId="1082955361" sldId="263"/>
-            <ac:spMk id="9" creationId="{DBC10131-5B4E-8281-475F-EEC8AD3C0831}"/>
-          </ac:spMkLst>
-        </pc:spChg>
-        <pc:spChg chg="del mod">
-          <ac:chgData name="krimy sorathiya" userId="c8748806f1572a9f" providerId="LiveId" clId="{F319521C-9DD0-48FA-8195-9FFA9C84884C}" dt="2024-10-13T08:35:20.485" v="203" actId="478"/>
-          <ac:spMkLst>
-            <pc:docMk/>
-            <pc:sldMk cId="1082955361" sldId="263"/>
-            <ac:spMk id="10" creationId="{FF16E2A8-157F-D2D3-F39E-C2E2775E1203}"/>
-          </ac:spMkLst>
-        </pc:spChg>
-        <pc:spChg chg="mod">
-          <ac:chgData name="krimy sorathiya" userId="c8748806f1572a9f" providerId="LiveId" clId="{F319521C-9DD0-48FA-8195-9FFA9C84884C}" dt="2024-10-13T08:34:05.430" v="187" actId="20577"/>
-          <ac:spMkLst>
-            <pc:docMk/>
-            <pc:sldMk cId="1082955361" sldId="263"/>
-            <ac:spMk id="11" creationId="{551C6D40-6273-C1B6-097A-9C3FD3B6B33C}"/>
-          </ac:spMkLst>
-        </pc:spChg>
-        <pc:spChg chg="add del">
-          <ac:chgData name="krimy sorathiya" userId="c8748806f1572a9f" providerId="LiveId" clId="{F319521C-9DD0-48FA-8195-9FFA9C84884C}" dt="2024-10-13T08:36:07.822" v="208"/>
-          <ac:spMkLst>
-            <pc:docMk/>
-            <pc:sldMk cId="1082955361" sldId="263"/>
-            <ac:spMk id="12" creationId="{07FB6C63-8899-4CFE-575D-E6659593D48E}"/>
-          </ac:spMkLst>
-        </pc:spChg>
-        <pc:spChg chg="add del mod">
-          <ac:chgData name="krimy sorathiya" userId="c8748806f1572a9f" providerId="LiveId" clId="{F319521C-9DD0-48FA-8195-9FFA9C84884C}" dt="2024-10-13T08:36:07.822" v="208"/>
-          <ac:spMkLst>
-            <pc:docMk/>
-            <pc:sldMk cId="1082955361" sldId="263"/>
-            <ac:spMk id="13" creationId="{D9C6DCA4-5687-E99E-CD05-531BBF20C7AB}"/>
-          </ac:spMkLst>
-        </pc:spChg>
-        <pc:spChg chg="del mod">
-          <ac:chgData name="krimy sorathiya" userId="c8748806f1572a9f" providerId="LiveId" clId="{F319521C-9DD0-48FA-8195-9FFA9C84884C}" dt="2024-10-13T08:37:28.497" v="218"/>
-          <ac:spMkLst>
-            <pc:docMk/>
-            <pc:sldMk cId="1082955361" sldId="263"/>
-            <ac:spMk id="14" creationId="{A0B3B2DB-E2EB-7556-37C5-99C569A1CC25}"/>
-          </ac:spMkLst>
-        </pc:spChg>
-        <pc:spChg chg="add del mod">
-          <ac:chgData name="krimy sorathiya" userId="c8748806f1572a9f" providerId="LiveId" clId="{F319521C-9DD0-48FA-8195-9FFA9C84884C}" dt="2024-10-13T08:37:28.497" v="218"/>
-          <ac:spMkLst>
-            <pc:docMk/>
-            <pc:sldMk cId="1082955361" sldId="263"/>
-            <ac:spMk id="16" creationId="{A9319AF3-FED7-2B70-D15D-BFDED8A041E8}"/>
-          </ac:spMkLst>
-        </pc:spChg>
-        <pc:spChg chg="add del mod">
-          <ac:chgData name="krimy sorathiya" userId="c8748806f1572a9f" providerId="LiveId" clId="{F319521C-9DD0-48FA-8195-9FFA9C84884C}" dt="2024-10-13T08:37:41.608" v="221"/>
-          <ac:spMkLst>
-            <pc:docMk/>
-            <pc:sldMk cId="1082955361" sldId="263"/>
-            <ac:spMk id="18" creationId="{39C0862D-AAFA-783E-F878-D3B82501F62A}"/>
-          </ac:spMkLst>
-        </pc:spChg>
-        <pc:spChg chg="add del mod">
-          <ac:chgData name="krimy sorathiya" userId="c8748806f1572a9f" providerId="LiveId" clId="{F319521C-9DD0-48FA-8195-9FFA9C84884C}" dt="2024-10-13T08:37:41.608" v="221"/>
-          <ac:spMkLst>
-            <pc:docMk/>
-            <pc:sldMk cId="1082955361" sldId="263"/>
-            <ac:spMk id="19" creationId="{703EA816-B646-E7D6-C395-91FC694A229D}"/>
-          </ac:spMkLst>
-        </pc:spChg>
-        <pc:spChg chg="mod">
-          <ac:chgData name="krimy sorathiya" userId="c8748806f1572a9f" providerId="LiveId" clId="{F319521C-9DD0-48FA-8195-9FFA9C84884C}" dt="2024-10-13T08:37:35.275" v="220"/>
-          <ac:spMkLst>
-            <pc:docMk/>
-            <pc:sldMk cId="1082955361" sldId="263"/>
-            <ac:spMk id="20" creationId="{981D82D3-94D8-F709-B83D-9FC2C6489745}"/>
-          </ac:spMkLst>
-        </pc:spChg>
-        <pc:spChg chg="add del mod">
-          <ac:chgData name="krimy sorathiya" userId="c8748806f1572a9f" providerId="LiveId" clId="{F319521C-9DD0-48FA-8195-9FFA9C84884C}" dt="2024-10-13T08:43:07.357" v="262"/>
-          <ac:spMkLst>
-            <pc:docMk/>
-            <pc:sldMk cId="1082955361" sldId="263"/>
-            <ac:spMk id="21" creationId="{20E954B7-B0B3-DF1A-8431-28D8B1BED3B3}"/>
-          </ac:spMkLst>
-        </pc:spChg>
-        <pc:spChg chg="mod">
-          <ac:chgData name="krimy sorathiya" userId="c8748806f1572a9f" providerId="LiveId" clId="{F319521C-9DD0-48FA-8195-9FFA9C84884C}" dt="2024-10-13T08:29:36.482" v="138" actId="14100"/>
-          <ac:spMkLst>
-            <pc:docMk/>
-            <pc:sldMk cId="1082955361" sldId="263"/>
-            <ac:spMk id="22" creationId="{794E019B-06E9-A8B7-CB83-25A8EB474A3E}"/>
-          </ac:spMkLst>
-        </pc:spChg>
-        <pc:spChg chg="add del">
-          <ac:chgData name="krimy sorathiya" userId="c8748806f1572a9f" providerId="LiveId" clId="{F319521C-9DD0-48FA-8195-9FFA9C84884C}" dt="2024-10-13T08:41:16.638" v="223" actId="478"/>
-          <ac:spMkLst>
-            <pc:docMk/>
-            <pc:sldMk cId="1082955361" sldId="263"/>
-            <ac:spMk id="23" creationId="{D18BC19B-EBE6-C654-BD84-2DE97DC4569E}"/>
-          </ac:spMkLst>
-        </pc:spChg>
-        <pc:spChg chg="add del mod">
-          <ac:chgData name="krimy sorathiya" userId="c8748806f1572a9f" providerId="LiveId" clId="{F319521C-9DD0-48FA-8195-9FFA9C84884C}" dt="2024-10-13T08:43:07.357" v="262"/>
-          <ac:spMkLst>
-            <pc:docMk/>
-            <pc:sldMk cId="1082955361" sldId="263"/>
-            <ac:spMk id="24" creationId="{12691ED7-1AFC-30A8-E253-2B37D6950605}"/>
-          </ac:spMkLst>
-        </pc:spChg>
-        <pc:spChg chg="mod">
-          <ac:chgData name="krimy sorathiya" userId="c8748806f1572a9f" providerId="LiveId" clId="{F319521C-9DD0-48FA-8195-9FFA9C84884C}" dt="2024-10-13T08:42:22.804" v="236"/>
-          <ac:spMkLst>
-            <pc:docMk/>
-            <pc:sldMk cId="1082955361" sldId="263"/>
-            <ac:spMk id="25" creationId="{59532170-3F28-70BC-252C-F538041CC4C9}"/>
-          </ac:spMkLst>
-        </pc:spChg>
-        <pc:spChg chg="add del mod">
-          <ac:chgData name="krimy sorathiya" userId="c8748806f1572a9f" providerId="LiveId" clId="{F319521C-9DD0-48FA-8195-9FFA9C84884C}" dt="2024-10-13T08:58:46.136" v="473" actId="164"/>
-          <ac:spMkLst>
-            <pc:docMk/>
-            <pc:sldMk cId="1082955361" sldId="263"/>
-            <ac:spMk id="26" creationId="{A8DAD7DC-9B89-33FA-587A-8609385E8828}"/>
-          </ac:spMkLst>
-        </pc:spChg>
-        <pc:spChg chg="add del mod">
-          <ac:chgData name="krimy sorathiya" userId="c8748806f1572a9f" providerId="LiveId" clId="{F319521C-9DD0-48FA-8195-9FFA9C84884C}" dt="2024-10-13T08:51:44.271" v="373" actId="478"/>
-          <ac:spMkLst>
-            <pc:docMk/>
-            <pc:sldMk cId="1082955361" sldId="263"/>
-            <ac:spMk id="27" creationId="{1F692618-E37F-5F7C-6740-08875ED9FC81}"/>
-          </ac:spMkLst>
-        </pc:spChg>
-        <pc:spChg chg="add del mod">
-          <ac:chgData name="krimy sorathiya" userId="c8748806f1572a9f" providerId="LiveId" clId="{F319521C-9DD0-48FA-8195-9FFA9C84884C}" dt="2024-10-13T08:45:23.130" v="289" actId="478"/>
-          <ac:spMkLst>
-            <pc:docMk/>
-            <pc:sldMk cId="1082955361" sldId="263"/>
-            <ac:spMk id="28" creationId="{D8C67ED8-7A95-79D8-ACE5-775C8D4DCA86}"/>
-          </ac:spMkLst>
-        </pc:spChg>
-        <pc:spChg chg="add del mod">
-          <ac:chgData name="krimy sorathiya" userId="c8748806f1572a9f" providerId="LiveId" clId="{F319521C-9DD0-48FA-8195-9FFA9C84884C}" dt="2024-10-13T08:51:44.271" v="373" actId="478"/>
-          <ac:spMkLst>
-            <pc:docMk/>
-            <pc:sldMk cId="1082955361" sldId="263"/>
-            <ac:spMk id="29" creationId="{A75005CB-7D34-8B18-520B-E7873152F334}"/>
-          </ac:spMkLst>
-        </pc:spChg>
-        <pc:spChg chg="add mod">
-          <ac:chgData name="krimy sorathiya" userId="c8748806f1572a9f" providerId="LiveId" clId="{F319521C-9DD0-48FA-8195-9FFA9C84884C}" dt="2024-10-13T13:35:00.473" v="1102" actId="1036"/>
-          <ac:spMkLst>
-            <pc:docMk/>
-            <pc:sldMk cId="1082955361" sldId="263"/>
-            <ac:spMk id="30" creationId="{3E17D188-8A46-9E12-B123-C6C86ACB7643}"/>
-          </ac:spMkLst>
-        </pc:spChg>
-        <pc:spChg chg="add mod">
-          <ac:chgData name="krimy sorathiya" userId="c8748806f1572a9f" providerId="LiveId" clId="{F319521C-9DD0-48FA-8195-9FFA9C84884C}" dt="2024-10-13T13:34:16.874" v="1094" actId="1076"/>
-          <ac:spMkLst>
-            <pc:docMk/>
-            <pc:sldMk cId="1082955361" sldId="263"/>
-            <ac:spMk id="31" creationId="{7EEEC532-DFC6-DA1C-CAB7-27E729E97AF7}"/>
-          </ac:spMkLst>
-        </pc:spChg>
-        <pc:spChg chg="add mod">
-          <ac:chgData name="krimy sorathiya" userId="c8748806f1572a9f" providerId="LiveId" clId="{F319521C-9DD0-48FA-8195-9FFA9C84884C}" dt="2024-10-13T12:51:38.366" v="1065" actId="1076"/>
-          <ac:spMkLst>
-            <pc:docMk/>
-            <pc:sldMk cId="1082955361" sldId="263"/>
-            <ac:spMk id="32" creationId="{299DFE9C-660A-1039-D785-549D2357D231}"/>
-          </ac:spMkLst>
-        </pc:spChg>
-        <pc:spChg chg="add mod">
-          <ac:chgData name="krimy sorathiya" userId="c8748806f1572a9f" providerId="LiveId" clId="{F319521C-9DD0-48FA-8195-9FFA9C84884C}" dt="2024-10-13T13:35:00.473" v="1102" actId="1036"/>
-          <ac:spMkLst>
-            <pc:docMk/>
-            <pc:sldMk cId="1082955361" sldId="263"/>
-            <ac:spMk id="33" creationId="{C1219209-CFEB-F97B-AF05-F9DCCD198C9E}"/>
-          </ac:spMkLst>
-        </pc:spChg>
-        <pc:spChg chg="add mod">
-          <ac:chgData name="krimy sorathiya" userId="c8748806f1572a9f" providerId="LiveId" clId="{F319521C-9DD0-48FA-8195-9FFA9C84884C}" dt="2024-10-13T13:34:23.491" v="1095" actId="1076"/>
-          <ac:spMkLst>
-            <pc:docMk/>
-            <pc:sldMk cId="1082955361" sldId="263"/>
-            <ac:spMk id="34" creationId="{54BA517B-3BE6-C51B-E35C-2EAE5352345F}"/>
-          </ac:spMkLst>
-        </pc:spChg>
-        <pc:spChg chg="add mod">
-          <ac:chgData name="krimy sorathiya" userId="c8748806f1572a9f" providerId="LiveId" clId="{F319521C-9DD0-48FA-8195-9FFA9C84884C}" dt="2024-10-13T08:58:53.775" v="475" actId="164"/>
-          <ac:spMkLst>
-            <pc:docMk/>
-            <pc:sldMk cId="1082955361" sldId="263"/>
-            <ac:spMk id="35" creationId="{C369E066-B95D-F641-F6F0-0C08F6AE3BF9}"/>
-          </ac:spMkLst>
-        </pc:spChg>
-        <pc:spChg chg="add mod">
-          <ac:chgData name="krimy sorathiya" userId="c8748806f1572a9f" providerId="LiveId" clId="{F319521C-9DD0-48FA-8195-9FFA9C84884C}" dt="2024-10-13T13:35:00.473" v="1102" actId="1036"/>
-          <ac:spMkLst>
-            <pc:docMk/>
-            <pc:sldMk cId="1082955361" sldId="263"/>
-            <ac:spMk id="36" creationId="{3DCDBC50-F2CA-0DE1-5F91-095CC14DAEDB}"/>
-          </ac:spMkLst>
-        </pc:spChg>
-        <pc:grpChg chg="add mod">
-          <ac:chgData name="krimy sorathiya" userId="c8748806f1572a9f" providerId="LiveId" clId="{F319521C-9DD0-48FA-8195-9FFA9C84884C}" dt="2024-10-13T13:33:59.125" v="1090" actId="1035"/>
-          <ac:grpSpMkLst>
-            <pc:docMk/>
-            <pc:sldMk cId="1082955361" sldId="263"/>
-            <ac:grpSpMk id="41" creationId="{FA942771-1615-1AE7-8FD3-F6A7F3B8ED41}"/>
-          </ac:grpSpMkLst>
-        </pc:grpChg>
-        <pc:grpChg chg="add mod">
-          <ac:chgData name="krimy sorathiya" userId="c8748806f1572a9f" providerId="LiveId" clId="{F319521C-9DD0-48FA-8195-9FFA9C84884C}" dt="2024-10-13T08:59:10.207" v="476" actId="465"/>
-          <ac:grpSpMkLst>
-            <pc:docMk/>
-            <pc:sldMk cId="1082955361" sldId="263"/>
-            <ac:grpSpMk id="42" creationId="{E6E0E9BD-C023-FC44-9C19-6F81197056E3}"/>
-          </ac:grpSpMkLst>
-        </pc:grpChg>
-        <pc:grpChg chg="add mod">
-          <ac:chgData name="krimy sorathiya" userId="c8748806f1572a9f" providerId="LiveId" clId="{F319521C-9DD0-48FA-8195-9FFA9C84884C}" dt="2024-10-13T08:58:53.775" v="475" actId="164"/>
-          <ac:grpSpMkLst>
-            <pc:docMk/>
-            <pc:sldMk cId="1082955361" sldId="263"/>
-            <ac:grpSpMk id="43" creationId="{4C78AE82-0015-5915-DCA7-FA13AFB6B840}"/>
-          </ac:grpSpMkLst>
-        </pc:grpChg>
-        <pc:cxnChg chg="add del mod">
-          <ac:chgData name="krimy sorathiya" userId="c8748806f1572a9f" providerId="LiveId" clId="{F319521C-9DD0-48FA-8195-9FFA9C84884C}" dt="2024-10-13T09:00:22.394" v="543" actId="478"/>
-          <ac:cxnSpMkLst>
-            <pc:docMk/>
-            <pc:sldMk cId="1082955361" sldId="263"/>
-            <ac:cxnSpMk id="38" creationId="{E164BF9B-BB46-6199-513B-D50D79A6173F}"/>
-          </ac:cxnSpMkLst>
-        </pc:cxnChg>
-        <pc:cxnChg chg="add del mod">
-          <ac:chgData name="krimy sorathiya" userId="c8748806f1572a9f" providerId="LiveId" clId="{F319521C-9DD0-48FA-8195-9FFA9C84884C}" dt="2024-10-13T09:00:23.826" v="544" actId="478"/>
-          <ac:cxnSpMkLst>
-            <pc:docMk/>
-            <pc:sldMk cId="1082955361" sldId="263"/>
-            <ac:cxnSpMk id="39" creationId="{1678D5C4-0C57-581E-44A9-49A2875B9C2A}"/>
-          </ac:cxnSpMkLst>
-        </pc:cxnChg>
-        <pc:cxnChg chg="add del mod">
-          <ac:chgData name="krimy sorathiya" userId="c8748806f1572a9f" providerId="LiveId" clId="{F319521C-9DD0-48FA-8195-9FFA9C84884C}" dt="2024-10-13T09:00:25.132" v="545" actId="478"/>
-          <ac:cxnSpMkLst>
-            <pc:docMk/>
-            <pc:sldMk cId="1082955361" sldId="263"/>
-            <ac:cxnSpMk id="40" creationId="{4837FB68-7C6B-EC82-860B-355EFB60CF7F}"/>
-          </ac:cxnSpMkLst>
-        </pc:cxnChg>
       </pc:sldChg>
       <pc:sldChg chg="delSp modSp add mod">
         <pc:chgData name="krimy sorathiya" userId="c8748806f1572a9f" providerId="LiveId" clId="{F319521C-9DD0-48FA-8195-9FFA9C84884C}" dt="2024-10-13T13:35:26.591" v="1109" actId="1036"/>
@@ -618,54 +186,6 @@
           <pc:docMk/>
           <pc:sldMk cId="3369774054" sldId="264"/>
         </pc:sldMkLst>
-        <pc:spChg chg="mod">
-          <ac:chgData name="krimy sorathiya" userId="c8748806f1572a9f" providerId="LiveId" clId="{F319521C-9DD0-48FA-8195-9FFA9C84884C}" dt="2024-10-13T09:25:56.881" v="1001" actId="12788"/>
-          <ac:spMkLst>
-            <pc:docMk/>
-            <pc:sldMk cId="3369774054" sldId="264"/>
-            <ac:spMk id="11" creationId="{DB4E0C2A-B462-8DB2-9967-74429989447B}"/>
-          </ac:spMkLst>
-        </pc:spChg>
-        <pc:spChg chg="mod">
-          <ac:chgData name="krimy sorathiya" userId="c8748806f1572a9f" providerId="LiveId" clId="{F319521C-9DD0-48FA-8195-9FFA9C84884C}" dt="2024-10-13T09:25:56.881" v="1001" actId="12788"/>
-          <ac:spMkLst>
-            <pc:docMk/>
-            <pc:sldMk cId="3369774054" sldId="264"/>
-            <ac:spMk id="22" creationId="{5F77E500-2813-FA61-860E-A258E09E8629}"/>
-          </ac:spMkLst>
-        </pc:spChg>
-        <pc:spChg chg="mod">
-          <ac:chgData name="krimy sorathiya" userId="c8748806f1572a9f" providerId="LiveId" clId="{F319521C-9DD0-48FA-8195-9FFA9C84884C}" dt="2024-10-13T13:35:26.591" v="1109" actId="1036"/>
-          <ac:spMkLst>
-            <pc:docMk/>
-            <pc:sldMk cId="3369774054" sldId="264"/>
-            <ac:spMk id="30" creationId="{2825BDED-A62A-6B16-7652-3387BB9A3F83}"/>
-          </ac:spMkLst>
-        </pc:spChg>
-        <pc:spChg chg="mod">
-          <ac:chgData name="krimy sorathiya" userId="c8748806f1572a9f" providerId="LiveId" clId="{F319521C-9DD0-48FA-8195-9FFA9C84884C}" dt="2024-10-13T13:35:26.591" v="1109" actId="1036"/>
-          <ac:spMkLst>
-            <pc:docMk/>
-            <pc:sldMk cId="3369774054" sldId="264"/>
-            <ac:spMk id="33" creationId="{2322A240-226D-AE9F-CF51-508F0BC3EE5F}"/>
-          </ac:spMkLst>
-        </pc:spChg>
-        <pc:spChg chg="del">
-          <ac:chgData name="krimy sorathiya" userId="c8748806f1572a9f" providerId="LiveId" clId="{F319521C-9DD0-48FA-8195-9FFA9C84884C}" dt="2024-10-13T09:01:46.471" v="627" actId="478"/>
-          <ac:spMkLst>
-            <pc:docMk/>
-            <pc:sldMk cId="3369774054" sldId="264"/>
-            <ac:spMk id="36" creationId="{CF815796-18CF-29E5-C7D4-4F08D228002D}"/>
-          </ac:spMkLst>
-        </pc:spChg>
-        <pc:grpChg chg="del">
-          <ac:chgData name="krimy sorathiya" userId="c8748806f1572a9f" providerId="LiveId" clId="{F319521C-9DD0-48FA-8195-9FFA9C84884C}" dt="2024-10-13T09:01:46.471" v="627" actId="478"/>
-          <ac:grpSpMkLst>
-            <pc:docMk/>
-            <pc:sldMk cId="3369774054" sldId="264"/>
-            <ac:grpSpMk id="43" creationId="{5C8DCA4D-B22E-73D0-883C-AA3EB4454408}"/>
-          </ac:grpSpMkLst>
-        </pc:grpChg>
       </pc:sldChg>
       <pc:sldChg chg="addSp delSp modSp add mod">
         <pc:chgData name="krimy sorathiya" userId="c8748806f1572a9f" providerId="LiveId" clId="{F319521C-9DD0-48FA-8195-9FFA9C84884C}" dt="2024-10-13T09:25:48.665" v="1000" actId="12788"/>
@@ -673,422 +193,6 @@
           <pc:docMk/>
           <pc:sldMk cId="2908074945" sldId="265"/>
         </pc:sldMkLst>
-        <pc:spChg chg="add del mod">
-          <ac:chgData name="krimy sorathiya" userId="c8748806f1572a9f" providerId="LiveId" clId="{F319521C-9DD0-48FA-8195-9FFA9C84884C}" dt="2024-10-13T09:07:57.885" v="689"/>
-          <ac:spMkLst>
-            <pc:docMk/>
-            <pc:sldMk cId="2908074945" sldId="265"/>
-            <ac:spMk id="2" creationId="{8ACD2571-B756-0723-6F2D-E52DC7670A34}"/>
-          </ac:spMkLst>
-        </pc:spChg>
-        <pc:spChg chg="add del mod">
-          <ac:chgData name="krimy sorathiya" userId="c8748806f1572a9f" providerId="LiveId" clId="{F319521C-9DD0-48FA-8195-9FFA9C84884C}" dt="2024-10-13T09:04:32.269" v="656" actId="11529"/>
-          <ac:spMkLst>
-            <pc:docMk/>
-            <pc:sldMk cId="2908074945" sldId="265"/>
-            <ac:spMk id="5" creationId="{E43C225E-AD83-D28E-64D0-2AED14295377}"/>
-          </ac:spMkLst>
-        </pc:spChg>
-        <pc:spChg chg="add del mod">
-          <ac:chgData name="krimy sorathiya" userId="c8748806f1572a9f" providerId="LiveId" clId="{F319521C-9DD0-48FA-8195-9FFA9C84884C}" dt="2024-10-13T09:07:57.885" v="689"/>
-          <ac:spMkLst>
-            <pc:docMk/>
-            <pc:sldMk cId="2908074945" sldId="265"/>
-            <ac:spMk id="6" creationId="{AF3D4A4B-335F-9486-3D47-DE3F039A33B9}"/>
-          </ac:spMkLst>
-        </pc:spChg>
-        <pc:spChg chg="add del mod">
-          <ac:chgData name="krimy sorathiya" userId="c8748806f1572a9f" providerId="LiveId" clId="{F319521C-9DD0-48FA-8195-9FFA9C84884C}" dt="2024-10-13T09:07:37.602" v="686"/>
-          <ac:spMkLst>
-            <pc:docMk/>
-            <pc:sldMk cId="2908074945" sldId="265"/>
-            <ac:spMk id="7" creationId="{AC3456BC-7922-39FB-6ED4-352C52301F36}"/>
-          </ac:spMkLst>
-        </pc:spChg>
-        <pc:spChg chg="add del">
-          <ac:chgData name="krimy sorathiya" userId="c8748806f1572a9f" providerId="LiveId" clId="{F319521C-9DD0-48FA-8195-9FFA9C84884C}" dt="2024-10-13T09:07:37.314" v="685" actId="11529"/>
-          <ac:spMkLst>
-            <pc:docMk/>
-            <pc:sldMk cId="2908074945" sldId="265"/>
-            <ac:spMk id="8" creationId="{1FBE03B9-D23E-C1B5-E50F-A7693B095D60}"/>
-          </ac:spMkLst>
-        </pc:spChg>
-        <pc:spChg chg="mod">
-          <ac:chgData name="krimy sorathiya" userId="c8748806f1572a9f" providerId="LiveId" clId="{F319521C-9DD0-48FA-8195-9FFA9C84884C}" dt="2024-10-13T09:07:35.990" v="684"/>
-          <ac:spMkLst>
-            <pc:docMk/>
-            <pc:sldMk cId="2908074945" sldId="265"/>
-            <ac:spMk id="9" creationId="{2BFDB466-E5C8-2815-D0D5-CBB1817B69E1}"/>
-          </ac:spMkLst>
-        </pc:spChg>
-        <pc:spChg chg="del mod">
-          <ac:chgData name="krimy sorathiya" userId="c8748806f1572a9f" providerId="LiveId" clId="{F319521C-9DD0-48FA-8195-9FFA9C84884C}" dt="2024-10-13T09:08:12.033" v="691"/>
-          <ac:spMkLst>
-            <pc:docMk/>
-            <pc:sldMk cId="2908074945" sldId="265"/>
-            <ac:spMk id="10" creationId="{71A90710-8406-30C5-B2DC-0AA7AF30A669}"/>
-          </ac:spMkLst>
-        </pc:spChg>
-        <pc:spChg chg="mod">
-          <ac:chgData name="krimy sorathiya" userId="c8748806f1572a9f" providerId="LiveId" clId="{F319521C-9DD0-48FA-8195-9FFA9C84884C}" dt="2024-10-13T09:25:48.665" v="1000" actId="12788"/>
-          <ac:spMkLst>
-            <pc:docMk/>
-            <pc:sldMk cId="2908074945" sldId="265"/>
-            <ac:spMk id="11" creationId="{4AA7C2D7-C896-C8CD-4F0E-E067FC56E43E}"/>
-          </ac:spMkLst>
-        </pc:spChg>
-        <pc:spChg chg="add del">
-          <ac:chgData name="krimy sorathiya" userId="c8748806f1572a9f" providerId="LiveId" clId="{F319521C-9DD0-48FA-8195-9FFA9C84884C}" dt="2024-10-13T09:08:12.033" v="691"/>
-          <ac:spMkLst>
-            <pc:docMk/>
-            <pc:sldMk cId="2908074945" sldId="265"/>
-            <ac:spMk id="12" creationId="{3FCEC236-A831-426C-D341-37F3195BE466}"/>
-          </ac:spMkLst>
-        </pc:spChg>
-        <pc:spChg chg="add del mod topLvl">
-          <ac:chgData name="krimy sorathiya" userId="c8748806f1572a9f" providerId="LiveId" clId="{F319521C-9DD0-48FA-8195-9FFA9C84884C}" dt="2024-10-13T09:13:01.711" v="741" actId="164"/>
-          <ac:spMkLst>
-            <pc:docMk/>
-            <pc:sldMk cId="2908074945" sldId="265"/>
-            <ac:spMk id="13" creationId="{345992F2-2BF8-900D-5EAF-7703222B5319}"/>
-          </ac:spMkLst>
-        </pc:spChg>
-        <pc:spChg chg="add mod topLvl">
-          <ac:chgData name="krimy sorathiya" userId="c8748806f1572a9f" providerId="LiveId" clId="{F319521C-9DD0-48FA-8195-9FFA9C84884C}" dt="2024-10-13T09:13:01.711" v="741" actId="164"/>
-          <ac:spMkLst>
-            <pc:docMk/>
-            <pc:sldMk cId="2908074945" sldId="265"/>
-            <ac:spMk id="14" creationId="{017EC640-5386-B95F-E7E5-1A7D53775491}"/>
-          </ac:spMkLst>
-        </pc:spChg>
-        <pc:spChg chg="add mod">
-          <ac:chgData name="krimy sorathiya" userId="c8748806f1572a9f" providerId="LiveId" clId="{F319521C-9DD0-48FA-8195-9FFA9C84884C}" dt="2024-10-13T09:14:21.255" v="765" actId="20577"/>
-          <ac:spMkLst>
-            <pc:docMk/>
-            <pc:sldMk cId="2908074945" sldId="265"/>
-            <ac:spMk id="20" creationId="{BC0BF3E8-9BD7-A3FB-667D-B19958D38676}"/>
-          </ac:spMkLst>
-        </pc:spChg>
-        <pc:spChg chg="mod">
-          <ac:chgData name="krimy sorathiya" userId="c8748806f1572a9f" providerId="LiveId" clId="{F319521C-9DD0-48FA-8195-9FFA9C84884C}" dt="2024-10-13T09:25:48.665" v="1000" actId="12788"/>
-          <ac:spMkLst>
-            <pc:docMk/>
-            <pc:sldMk cId="2908074945" sldId="265"/>
-            <ac:spMk id="22" creationId="{75607BA3-96B1-904B-FFCA-87C2C1C0349B}"/>
-          </ac:spMkLst>
-        </pc:spChg>
-        <pc:spChg chg="mod">
-          <ac:chgData name="krimy sorathiya" userId="c8748806f1572a9f" providerId="LiveId" clId="{F319521C-9DD0-48FA-8195-9FFA9C84884C}" dt="2024-10-13T09:13:54.410" v="755"/>
-          <ac:spMkLst>
-            <pc:docMk/>
-            <pc:sldMk cId="2908074945" sldId="265"/>
-            <ac:spMk id="25" creationId="{87F06DE1-E6B9-6A3D-A923-FB4AD4514F22}"/>
-          </ac:spMkLst>
-        </pc:spChg>
-        <pc:spChg chg="mod">
-          <ac:chgData name="krimy sorathiya" userId="c8748806f1572a9f" providerId="LiveId" clId="{F319521C-9DD0-48FA-8195-9FFA9C84884C}" dt="2024-10-13T09:13:54.410" v="755"/>
-          <ac:spMkLst>
-            <pc:docMk/>
-            <pc:sldMk cId="2908074945" sldId="265"/>
-            <ac:spMk id="27" creationId="{9E4D5CA8-5D3A-BEE9-C60F-8D41CA51DB7B}"/>
-          </ac:spMkLst>
-        </pc:spChg>
-        <pc:spChg chg="mod">
-          <ac:chgData name="krimy sorathiya" userId="c8748806f1572a9f" providerId="LiveId" clId="{F319521C-9DD0-48FA-8195-9FFA9C84884C}" dt="2024-10-13T09:13:54.410" v="755"/>
-          <ac:spMkLst>
-            <pc:docMk/>
-            <pc:sldMk cId="2908074945" sldId="265"/>
-            <ac:spMk id="28" creationId="{4FAC9A28-8865-5348-33F5-ED7C7FEE3146}"/>
-          </ac:spMkLst>
-        </pc:spChg>
-        <pc:spChg chg="del mod">
-          <ac:chgData name="krimy sorathiya" userId="c8748806f1572a9f" providerId="LiveId" clId="{F319521C-9DD0-48FA-8195-9FFA9C84884C}" dt="2024-10-13T09:02:35.787" v="646" actId="478"/>
-          <ac:spMkLst>
-            <pc:docMk/>
-            <pc:sldMk cId="2908074945" sldId="265"/>
-            <ac:spMk id="30" creationId="{D24FAFF1-CE7D-B30F-4651-D40DA357F70A}"/>
-          </ac:spMkLst>
-        </pc:spChg>
-        <pc:spChg chg="del">
-          <ac:chgData name="krimy sorathiya" userId="c8748806f1572a9f" providerId="LiveId" clId="{F319521C-9DD0-48FA-8195-9FFA9C84884C}" dt="2024-10-13T09:02:44.776" v="649" actId="478"/>
-          <ac:spMkLst>
-            <pc:docMk/>
-            <pc:sldMk cId="2908074945" sldId="265"/>
-            <ac:spMk id="33" creationId="{EF4534C4-8C71-EBD9-F0C5-EF672E2B9443}"/>
-          </ac:spMkLst>
-        </pc:spChg>
-        <pc:spChg chg="mod">
-          <ac:chgData name="krimy sorathiya" userId="c8748806f1572a9f" providerId="LiveId" clId="{F319521C-9DD0-48FA-8195-9FFA9C84884C}" dt="2024-10-13T09:14:01.713" v="758"/>
-          <ac:spMkLst>
-            <pc:docMk/>
-            <pc:sldMk cId="2908074945" sldId="265"/>
-            <ac:spMk id="35" creationId="{13D3F5AA-EDB3-0696-ABE5-FDF603CC3BCE}"/>
-          </ac:spMkLst>
-        </pc:spChg>
-        <pc:spChg chg="mod">
-          <ac:chgData name="krimy sorathiya" userId="c8748806f1572a9f" providerId="LiveId" clId="{F319521C-9DD0-48FA-8195-9FFA9C84884C}" dt="2024-10-13T09:14:01.713" v="758"/>
-          <ac:spMkLst>
-            <pc:docMk/>
-            <pc:sldMk cId="2908074945" sldId="265"/>
-            <ac:spMk id="36" creationId="{AE7BC3AB-1822-8EAF-3969-4AAAD199D440}"/>
-          </ac:spMkLst>
-        </pc:spChg>
-        <pc:spChg chg="mod">
-          <ac:chgData name="krimy sorathiya" userId="c8748806f1572a9f" providerId="LiveId" clId="{F319521C-9DD0-48FA-8195-9FFA9C84884C}" dt="2024-10-13T09:14:01.713" v="758"/>
-          <ac:spMkLst>
-            <pc:docMk/>
-            <pc:sldMk cId="2908074945" sldId="265"/>
-            <ac:spMk id="37" creationId="{F6E04037-EC25-0D44-D45D-22C628B84135}"/>
-          </ac:spMkLst>
-        </pc:spChg>
-        <pc:spChg chg="mod">
-          <ac:chgData name="krimy sorathiya" userId="c8748806f1572a9f" providerId="LiveId" clId="{F319521C-9DD0-48FA-8195-9FFA9C84884C}" dt="2024-10-13T09:14:23.633" v="767" actId="20577"/>
-          <ac:spMkLst>
-            <pc:docMk/>
-            <pc:sldMk cId="2908074945" sldId="265"/>
-            <ac:spMk id="40" creationId="{59A820E8-7BB2-519C-C245-F902B0538B66}"/>
-          </ac:spMkLst>
-        </pc:spChg>
-        <pc:spChg chg="mod">
-          <ac:chgData name="krimy sorathiya" userId="c8748806f1572a9f" providerId="LiveId" clId="{F319521C-9DD0-48FA-8195-9FFA9C84884C}" dt="2024-10-13T09:14:04.833" v="759"/>
-          <ac:spMkLst>
-            <pc:docMk/>
-            <pc:sldMk cId="2908074945" sldId="265"/>
-            <ac:spMk id="43" creationId="{7C25CDA6-FE09-E2AF-2EF4-749CE76181DA}"/>
-          </ac:spMkLst>
-        </pc:spChg>
-        <pc:spChg chg="mod">
-          <ac:chgData name="krimy sorathiya" userId="c8748806f1572a9f" providerId="LiveId" clId="{F319521C-9DD0-48FA-8195-9FFA9C84884C}" dt="2024-10-13T09:14:04.833" v="759"/>
-          <ac:spMkLst>
-            <pc:docMk/>
-            <pc:sldMk cId="2908074945" sldId="265"/>
-            <ac:spMk id="44" creationId="{4335643C-5624-ED41-51B4-BF122200A069}"/>
-          </ac:spMkLst>
-        </pc:spChg>
-        <pc:spChg chg="mod">
-          <ac:chgData name="krimy sorathiya" userId="c8748806f1572a9f" providerId="LiveId" clId="{F319521C-9DD0-48FA-8195-9FFA9C84884C}" dt="2024-10-13T09:14:26.134" v="769" actId="20577"/>
-          <ac:spMkLst>
-            <pc:docMk/>
-            <pc:sldMk cId="2908074945" sldId="265"/>
-            <ac:spMk id="47" creationId="{AB3E6366-C6BA-9FA5-2869-BD8F0D85C0B5}"/>
-          </ac:spMkLst>
-        </pc:spChg>
-        <pc:spChg chg="mod">
-          <ac:chgData name="krimy sorathiya" userId="c8748806f1572a9f" providerId="LiveId" clId="{F319521C-9DD0-48FA-8195-9FFA9C84884C}" dt="2024-10-13T09:14:09.336" v="761"/>
-          <ac:spMkLst>
-            <pc:docMk/>
-            <pc:sldMk cId="2908074945" sldId="265"/>
-            <ac:spMk id="48" creationId="{4E88733E-5A50-C638-2240-D925F7B390A2}"/>
-          </ac:spMkLst>
-        </pc:spChg>
-        <pc:spChg chg="mod">
-          <ac:chgData name="krimy sorathiya" userId="c8748806f1572a9f" providerId="LiveId" clId="{F319521C-9DD0-48FA-8195-9FFA9C84884C}" dt="2024-10-13T09:14:09.336" v="761"/>
-          <ac:spMkLst>
-            <pc:docMk/>
-            <pc:sldMk cId="2908074945" sldId="265"/>
-            <ac:spMk id="49" creationId="{504F5930-1D85-1282-6D87-6D10682946CF}"/>
-          </ac:spMkLst>
-        </pc:spChg>
-        <pc:spChg chg="mod">
-          <ac:chgData name="krimy sorathiya" userId="c8748806f1572a9f" providerId="LiveId" clId="{F319521C-9DD0-48FA-8195-9FFA9C84884C}" dt="2024-10-13T09:14:28.587" v="771" actId="20577"/>
-          <ac:spMkLst>
-            <pc:docMk/>
-            <pc:sldMk cId="2908074945" sldId="265"/>
-            <ac:spMk id="52" creationId="{BE22D87C-DC58-64E2-E2E7-D64A934E44CF}"/>
-          </ac:spMkLst>
-        </pc:spChg>
-        <pc:spChg chg="mod">
-          <ac:chgData name="krimy sorathiya" userId="c8748806f1572a9f" providerId="LiveId" clId="{F319521C-9DD0-48FA-8195-9FFA9C84884C}" dt="2024-10-13T09:14:10.662" v="762"/>
-          <ac:spMkLst>
-            <pc:docMk/>
-            <pc:sldMk cId="2908074945" sldId="265"/>
-            <ac:spMk id="53" creationId="{F7C4F4C6-B1E1-5F70-B11E-84D1979C3FB8}"/>
-          </ac:spMkLst>
-        </pc:spChg>
-        <pc:spChg chg="mod">
-          <ac:chgData name="krimy sorathiya" userId="c8748806f1572a9f" providerId="LiveId" clId="{F319521C-9DD0-48FA-8195-9FFA9C84884C}" dt="2024-10-13T09:14:10.662" v="762"/>
-          <ac:spMkLst>
-            <pc:docMk/>
-            <pc:sldMk cId="2908074945" sldId="265"/>
-            <ac:spMk id="54" creationId="{BB5CEF16-B9A6-020E-4588-DC3D9FD233E9}"/>
-          </ac:spMkLst>
-        </pc:spChg>
-        <pc:spChg chg="add mod">
-          <ac:chgData name="krimy sorathiya" userId="c8748806f1572a9f" providerId="LiveId" clId="{F319521C-9DD0-48FA-8195-9FFA9C84884C}" dt="2024-10-13T09:15:26.407" v="796" actId="20577"/>
-          <ac:spMkLst>
-            <pc:docMk/>
-            <pc:sldMk cId="2908074945" sldId="265"/>
-            <ac:spMk id="55" creationId="{A3691FEE-A948-49D3-A759-CE65772EA6B0}"/>
-          </ac:spMkLst>
-        </pc:spChg>
-        <pc:spChg chg="add mod">
-          <ac:chgData name="krimy sorathiya" userId="c8748806f1572a9f" providerId="LiveId" clId="{F319521C-9DD0-48FA-8195-9FFA9C84884C}" dt="2024-10-13T09:21:14.895" v="936" actId="14100"/>
-          <ac:spMkLst>
-            <pc:docMk/>
-            <pc:sldMk cId="2908074945" sldId="265"/>
-            <ac:spMk id="56" creationId="{C3B348CD-A474-C7D4-0534-C557385D8716}"/>
-          </ac:spMkLst>
-        </pc:spChg>
-        <pc:spChg chg="add mod">
-          <ac:chgData name="krimy sorathiya" userId="c8748806f1572a9f" providerId="LiveId" clId="{F319521C-9DD0-48FA-8195-9FFA9C84884C}" dt="2024-10-13T09:21:37.392" v="939" actId="20577"/>
-          <ac:spMkLst>
-            <pc:docMk/>
-            <pc:sldMk cId="2908074945" sldId="265"/>
-            <ac:spMk id="57" creationId="{A9A5D638-1D41-E86F-1E8E-A07F6275FB5F}"/>
-          </ac:spMkLst>
-        </pc:spChg>
-        <pc:spChg chg="add mod">
-          <ac:chgData name="krimy sorathiya" userId="c8748806f1572a9f" providerId="LiveId" clId="{F319521C-9DD0-48FA-8195-9FFA9C84884C}" dt="2024-10-13T09:21:25.011" v="938" actId="14100"/>
-          <ac:spMkLst>
-            <pc:docMk/>
-            <pc:sldMk cId="2908074945" sldId="265"/>
-            <ac:spMk id="58" creationId="{EB0149A6-E1F5-D0D6-2C7A-E7E4C3C449C8}"/>
-          </ac:spMkLst>
-        </pc:spChg>
-        <pc:spChg chg="add mod">
-          <ac:chgData name="krimy sorathiya" userId="c8748806f1572a9f" providerId="LiveId" clId="{F319521C-9DD0-48FA-8195-9FFA9C84884C}" dt="2024-10-13T09:20:52.221" v="930" actId="14100"/>
-          <ac:spMkLst>
-            <pc:docMk/>
-            <pc:sldMk cId="2908074945" sldId="265"/>
-            <ac:spMk id="59" creationId="{B707341D-9928-A5CF-3905-A8E94B71036A}"/>
-          </ac:spMkLst>
-        </pc:spChg>
-        <pc:grpChg chg="add del mod">
-          <ac:chgData name="krimy sorathiya" userId="c8748806f1572a9f" providerId="LiveId" clId="{F319521C-9DD0-48FA-8195-9FFA9C84884C}" dt="2024-10-13T09:12:32.717" v="736" actId="165"/>
-          <ac:grpSpMkLst>
-            <pc:docMk/>
-            <pc:sldMk cId="2908074945" sldId="265"/>
-            <ac:grpSpMk id="16" creationId="{EDC3A883-C0D6-E4D0-C623-6F13BE8B10F3}"/>
-          </ac:grpSpMkLst>
-        </pc:grpChg>
-        <pc:grpChg chg="add mod">
-          <ac:chgData name="krimy sorathiya" userId="c8748806f1572a9f" providerId="LiveId" clId="{F319521C-9DD0-48FA-8195-9FFA9C84884C}" dt="2024-10-13T09:12:49.445" v="739" actId="164"/>
-          <ac:grpSpMkLst>
-            <pc:docMk/>
-            <pc:sldMk cId="2908074945" sldId="265"/>
-            <ac:grpSpMk id="18" creationId="{0C303580-5594-AA20-9A32-67F6069D0005}"/>
-          </ac:grpSpMkLst>
-        </pc:grpChg>
-        <pc:grpChg chg="add mod">
-          <ac:chgData name="krimy sorathiya" userId="c8748806f1572a9f" providerId="LiveId" clId="{F319521C-9DD0-48FA-8195-9FFA9C84884C}" dt="2024-10-13T09:13:25.582" v="744" actId="164"/>
-          <ac:grpSpMkLst>
-            <pc:docMk/>
-            <pc:sldMk cId="2908074945" sldId="265"/>
-            <ac:grpSpMk id="19" creationId="{CD07ECE4-95CD-B60F-3411-24B90D996312}"/>
-          </ac:grpSpMkLst>
-        </pc:grpChg>
-        <pc:grpChg chg="add mod">
-          <ac:chgData name="krimy sorathiya" userId="c8748806f1572a9f" providerId="LiveId" clId="{F319521C-9DD0-48FA-8195-9FFA9C84884C}" dt="2024-10-13T09:13:57.425" v="756" actId="1076"/>
-          <ac:grpSpMkLst>
-            <pc:docMk/>
-            <pc:sldMk cId="2908074945" sldId="265"/>
-            <ac:grpSpMk id="21" creationId="{2C960BAA-ED74-69A6-8753-FE02FE59D777}"/>
-          </ac:grpSpMkLst>
-        </pc:grpChg>
-        <pc:grpChg chg="add mod">
-          <ac:chgData name="krimy sorathiya" userId="c8748806f1572a9f" providerId="LiveId" clId="{F319521C-9DD0-48FA-8195-9FFA9C84884C}" dt="2024-10-13T09:13:54.410" v="755"/>
-          <ac:grpSpMkLst>
-            <pc:docMk/>
-            <pc:sldMk cId="2908074945" sldId="265"/>
-            <ac:grpSpMk id="23" creationId="{96891628-8EE1-BEAA-41BD-CE663E692C58}"/>
-          </ac:grpSpMkLst>
-        </pc:grpChg>
-        <pc:grpChg chg="mod">
-          <ac:chgData name="krimy sorathiya" userId="c8748806f1572a9f" providerId="LiveId" clId="{F319521C-9DD0-48FA-8195-9FFA9C84884C}" dt="2024-10-13T09:13:54.410" v="755"/>
-          <ac:grpSpMkLst>
-            <pc:docMk/>
-            <pc:sldMk cId="2908074945" sldId="265"/>
-            <ac:grpSpMk id="24" creationId="{D3F32105-E165-21F0-9097-6C636BDA2F2B}"/>
-          </ac:grpSpMkLst>
-        </pc:grpChg>
-        <pc:grpChg chg="add mod">
-          <ac:chgData name="krimy sorathiya" userId="c8748806f1572a9f" providerId="LiveId" clId="{F319521C-9DD0-48FA-8195-9FFA9C84884C}" dt="2024-10-13T09:14:01.713" v="758"/>
-          <ac:grpSpMkLst>
-            <pc:docMk/>
-            <pc:sldMk cId="2908074945" sldId="265"/>
-            <ac:grpSpMk id="29" creationId="{3B40AE98-8F08-44DA-AAE8-E2B68A033E62}"/>
-          </ac:grpSpMkLst>
-        </pc:grpChg>
-        <pc:grpChg chg="mod">
-          <ac:chgData name="krimy sorathiya" userId="c8748806f1572a9f" providerId="LiveId" clId="{F319521C-9DD0-48FA-8195-9FFA9C84884C}" dt="2024-10-13T09:14:01.713" v="758"/>
-          <ac:grpSpMkLst>
-            <pc:docMk/>
-            <pc:sldMk cId="2908074945" sldId="265"/>
-            <ac:grpSpMk id="34" creationId="{4CAE4C78-8D89-BBB8-A6E3-C7C853524D1C}"/>
-          </ac:grpSpMkLst>
-        </pc:grpChg>
-        <pc:grpChg chg="add mod">
-          <ac:chgData name="krimy sorathiya" userId="c8748806f1572a9f" providerId="LiveId" clId="{F319521C-9DD0-48FA-8195-9FFA9C84884C}" dt="2024-10-13T09:14:08.339" v="760" actId="1076"/>
-          <ac:grpSpMkLst>
-            <pc:docMk/>
-            <pc:sldMk cId="2908074945" sldId="265"/>
-            <ac:grpSpMk id="38" creationId="{080E8CFA-ACB1-C1E8-50F9-0E16B1741169}"/>
-          </ac:grpSpMkLst>
-        </pc:grpChg>
-        <pc:grpChg chg="mod">
-          <ac:chgData name="krimy sorathiya" userId="c8748806f1572a9f" providerId="LiveId" clId="{F319521C-9DD0-48FA-8195-9FFA9C84884C}" dt="2024-10-13T09:14:04.833" v="759"/>
-          <ac:grpSpMkLst>
-            <pc:docMk/>
-            <pc:sldMk cId="2908074945" sldId="265"/>
-            <ac:grpSpMk id="39" creationId="{32C5A879-4580-81A7-C292-BE2B90A68BFD}"/>
-          </ac:grpSpMkLst>
-        </pc:grpChg>
-        <pc:grpChg chg="del">
-          <ac:chgData name="krimy sorathiya" userId="c8748806f1572a9f" providerId="LiveId" clId="{F319521C-9DD0-48FA-8195-9FFA9C84884C}" dt="2024-10-13T09:02:33.696" v="644" actId="478"/>
-          <ac:grpSpMkLst>
-            <pc:docMk/>
-            <pc:sldMk cId="2908074945" sldId="265"/>
-            <ac:grpSpMk id="41" creationId="{CFDEBBB3-74C8-872F-7D08-9ED94769DA44}"/>
-          </ac:grpSpMkLst>
-        </pc:grpChg>
-        <pc:grpChg chg="del">
-          <ac:chgData name="krimy sorathiya" userId="c8748806f1572a9f" providerId="LiveId" clId="{F319521C-9DD0-48FA-8195-9FFA9C84884C}" dt="2024-10-13T09:02:44.776" v="649" actId="478"/>
-          <ac:grpSpMkLst>
-            <pc:docMk/>
-            <pc:sldMk cId="2908074945" sldId="265"/>
-            <ac:grpSpMk id="42" creationId="{90F62630-0AA1-E576-5A0A-987A444B4C80}"/>
-          </ac:grpSpMkLst>
-        </pc:grpChg>
-        <pc:grpChg chg="add mod">
-          <ac:chgData name="krimy sorathiya" userId="c8748806f1572a9f" providerId="LiveId" clId="{F319521C-9DD0-48FA-8195-9FFA9C84884C}" dt="2024-10-13T09:14:09.336" v="761"/>
-          <ac:grpSpMkLst>
-            <pc:docMk/>
-            <pc:sldMk cId="2908074945" sldId="265"/>
-            <ac:grpSpMk id="45" creationId="{9A6C4439-0FB0-FEDE-FE54-77E324C9B03A}"/>
-          </ac:grpSpMkLst>
-        </pc:grpChg>
-        <pc:grpChg chg="mod">
-          <ac:chgData name="krimy sorathiya" userId="c8748806f1572a9f" providerId="LiveId" clId="{F319521C-9DD0-48FA-8195-9FFA9C84884C}" dt="2024-10-13T09:14:09.336" v="761"/>
-          <ac:grpSpMkLst>
-            <pc:docMk/>
-            <pc:sldMk cId="2908074945" sldId="265"/>
-            <ac:grpSpMk id="46" creationId="{EA3206F1-CA5C-B99B-19E8-808205AC1C3B}"/>
-          </ac:grpSpMkLst>
-        </pc:grpChg>
-        <pc:grpChg chg="add mod">
-          <ac:chgData name="krimy sorathiya" userId="c8748806f1572a9f" providerId="LiveId" clId="{F319521C-9DD0-48FA-8195-9FFA9C84884C}" dt="2024-10-13T09:14:10.662" v="762"/>
-          <ac:grpSpMkLst>
-            <pc:docMk/>
-            <pc:sldMk cId="2908074945" sldId="265"/>
-            <ac:grpSpMk id="50" creationId="{64AE9783-26B3-3D63-AFE9-076612949B05}"/>
-          </ac:grpSpMkLst>
-        </pc:grpChg>
-        <pc:grpChg chg="mod">
-          <ac:chgData name="krimy sorathiya" userId="c8748806f1572a9f" providerId="LiveId" clId="{F319521C-9DD0-48FA-8195-9FFA9C84884C}" dt="2024-10-13T09:14:10.662" v="762"/>
-          <ac:grpSpMkLst>
-            <pc:docMk/>
-            <pc:sldMk cId="2908074945" sldId="265"/>
-            <ac:grpSpMk id="51" creationId="{33DA4435-86C6-C8CD-7215-4AA0322A6808}"/>
-          </ac:grpSpMkLst>
-        </pc:grpChg>
-        <pc:picChg chg="mod">
-          <ac:chgData name="krimy sorathiya" userId="c8748806f1572a9f" providerId="LiveId" clId="{F319521C-9DD0-48FA-8195-9FFA9C84884C}" dt="2024-10-13T09:17:43.755" v="894" actId="1076"/>
-          <ac:picMkLst>
-            <pc:docMk/>
-            <pc:sldMk cId="2908074945" sldId="265"/>
-            <ac:picMk id="4" creationId="{BE187974-4B32-DC90-77F7-0B54725962C6}"/>
-          </ac:picMkLst>
-        </pc:picChg>
       </pc:sldChg>
       <pc:sldChg chg="modSp add mod ord">
         <pc:chgData name="krimy sorathiya" userId="c8748806f1572a9f" providerId="LiveId" clId="{F319521C-9DD0-48FA-8195-9FFA9C84884C}" dt="2024-10-13T09:25:39.295" v="999" actId="12788"/>
@@ -1096,44 +200,28 @@
           <pc:docMk/>
           <pc:sldMk cId="3449012070" sldId="266"/>
         </pc:sldMkLst>
+      </pc:sldChg>
+    </pc:docChg>
+  </pc:docChgLst>
+  <pc:docChgLst>
+    <pc:chgData name="krimy sorathiya" userId="c8748806f1572a9f" providerId="LiveId" clId="{470BBF38-78DB-4EB1-9CCC-AE09B35AC670}"/>
+    <pc:docChg chg="modSld">
+      <pc:chgData name="krimy sorathiya" userId="c8748806f1572a9f" providerId="LiveId" clId="{470BBF38-78DB-4EB1-9CCC-AE09B35AC670}" dt="2025-02-26T14:29:21.342" v="25" actId="20577"/>
+      <pc:docMkLst>
+        <pc:docMk/>
+      </pc:docMkLst>
+      <pc:sldChg chg="modSp mod">
+        <pc:chgData name="krimy sorathiya" userId="c8748806f1572a9f" providerId="LiveId" clId="{470BBF38-78DB-4EB1-9CCC-AE09B35AC670}" dt="2025-02-26T14:29:21.342" v="25" actId="20577"/>
+        <pc:sldMkLst>
+          <pc:docMk/>
+          <pc:sldMk cId="2493816262" sldId="259"/>
+        </pc:sldMkLst>
         <pc:spChg chg="mod">
-          <ac:chgData name="krimy sorathiya" userId="c8748806f1572a9f" providerId="LiveId" clId="{F319521C-9DD0-48FA-8195-9FFA9C84884C}" dt="2024-10-13T09:25:39.295" v="999" actId="12788"/>
+          <ac:chgData name="krimy sorathiya" userId="c8748806f1572a9f" providerId="LiveId" clId="{470BBF38-78DB-4EB1-9CCC-AE09B35AC670}" dt="2025-02-26T14:29:21.342" v="25" actId="20577"/>
           <ac:spMkLst>
             <pc:docMk/>
-            <pc:sldMk cId="3449012070" sldId="266"/>
-            <ac:spMk id="11" creationId="{D10DCCDB-C0A1-1100-A9E2-27873B90BA35}"/>
-          </ac:spMkLst>
-        </pc:spChg>
-        <pc:spChg chg="mod">
-          <ac:chgData name="krimy sorathiya" userId="c8748806f1572a9f" providerId="LiveId" clId="{F319521C-9DD0-48FA-8195-9FFA9C84884C}" dt="2024-10-13T09:25:39.295" v="999" actId="12788"/>
-          <ac:spMkLst>
-            <pc:docMk/>
-            <pc:sldMk cId="3449012070" sldId="266"/>
-            <ac:spMk id="22" creationId="{EEA2B4AD-C7D1-4D8C-5566-532D672D6C74}"/>
-          </ac:spMkLst>
-        </pc:spChg>
-        <pc:spChg chg="mod">
-          <ac:chgData name="krimy sorathiya" userId="c8748806f1572a9f" providerId="LiveId" clId="{F319521C-9DD0-48FA-8195-9FFA9C84884C}" dt="2024-10-13T09:25:00.860" v="966" actId="20577"/>
-          <ac:spMkLst>
-            <pc:docMk/>
-            <pc:sldMk cId="3449012070" sldId="266"/>
-            <ac:spMk id="30" creationId="{C57948AF-1A16-9C3E-7534-A7813C70135C}"/>
-          </ac:spMkLst>
-        </pc:spChg>
-        <pc:spChg chg="mod">
-          <ac:chgData name="krimy sorathiya" userId="c8748806f1572a9f" providerId="LiveId" clId="{F319521C-9DD0-48FA-8195-9FFA9C84884C}" dt="2024-10-13T09:25:13.702" v="981"/>
-          <ac:spMkLst>
-            <pc:docMk/>
-            <pc:sldMk cId="3449012070" sldId="266"/>
-            <ac:spMk id="33" creationId="{5ED20F0D-8927-7DD9-EBD1-047E453A0EE2}"/>
-          </ac:spMkLst>
-        </pc:spChg>
-        <pc:spChg chg="mod">
-          <ac:chgData name="krimy sorathiya" userId="c8748806f1572a9f" providerId="LiveId" clId="{F319521C-9DD0-48FA-8195-9FFA9C84884C}" dt="2024-10-13T09:25:25.771" v="997" actId="20577"/>
-          <ac:spMkLst>
-            <pc:docMk/>
-            <pc:sldMk cId="3449012070" sldId="266"/>
-            <ac:spMk id="36" creationId="{C17377F5-24F8-5ED7-5819-9773704DC8B1}"/>
+            <pc:sldMk cId="2493816262" sldId="259"/>
+            <ac:spMk id="3" creationId="{C3E3162F-E14E-761E-4A62-31DFB25FE44E}"/>
           </ac:spMkLst>
         </pc:spChg>
       </pc:sldChg>
@@ -1291,7 +379,7 @@
           <a:p>
             <a:fld id="{90A1AF40-B069-4308-AE37-059D9D6205A9}" type="datetimeFigureOut">
               <a:rPr lang="en-IN" smtClean="0"/>
-              <a:t>13-10-2024</a:t>
+              <a:t>26-02-2025</a:t>
             </a:fld>
             <a:endParaRPr lang="en-IN"/>
           </a:p>
@@ -1491,7 +579,7 @@
           <a:p>
             <a:fld id="{90A1AF40-B069-4308-AE37-059D9D6205A9}" type="datetimeFigureOut">
               <a:rPr lang="en-IN" smtClean="0"/>
-              <a:t>13-10-2024</a:t>
+              <a:t>26-02-2025</a:t>
             </a:fld>
             <a:endParaRPr lang="en-IN"/>
           </a:p>
@@ -1701,7 +789,7 @@
           <a:p>
             <a:fld id="{90A1AF40-B069-4308-AE37-059D9D6205A9}" type="datetimeFigureOut">
               <a:rPr lang="en-IN" smtClean="0"/>
-              <a:t>13-10-2024</a:t>
+              <a:t>26-02-2025</a:t>
             </a:fld>
             <a:endParaRPr lang="en-IN"/>
           </a:p>
@@ -1901,7 +989,7 @@
           <a:p>
             <a:fld id="{90A1AF40-B069-4308-AE37-059D9D6205A9}" type="datetimeFigureOut">
               <a:rPr lang="en-IN" smtClean="0"/>
-              <a:t>13-10-2024</a:t>
+              <a:t>26-02-2025</a:t>
             </a:fld>
             <a:endParaRPr lang="en-IN"/>
           </a:p>
@@ -2177,7 +1265,7 @@
           <a:p>
             <a:fld id="{90A1AF40-B069-4308-AE37-059D9D6205A9}" type="datetimeFigureOut">
               <a:rPr lang="en-IN" smtClean="0"/>
-              <a:t>13-10-2024</a:t>
+              <a:t>26-02-2025</a:t>
             </a:fld>
             <a:endParaRPr lang="en-IN"/>
           </a:p>
@@ -2445,7 +1533,7 @@
           <a:p>
             <a:fld id="{90A1AF40-B069-4308-AE37-059D9D6205A9}" type="datetimeFigureOut">
               <a:rPr lang="en-IN" smtClean="0"/>
-              <a:t>13-10-2024</a:t>
+              <a:t>26-02-2025</a:t>
             </a:fld>
             <a:endParaRPr lang="en-IN"/>
           </a:p>
@@ -2860,7 +1948,7 @@
           <a:p>
             <a:fld id="{90A1AF40-B069-4308-AE37-059D9D6205A9}" type="datetimeFigureOut">
               <a:rPr lang="en-IN" smtClean="0"/>
-              <a:t>13-10-2024</a:t>
+              <a:t>26-02-2025</a:t>
             </a:fld>
             <a:endParaRPr lang="en-IN"/>
           </a:p>
@@ -3002,7 +2090,7 @@
           <a:p>
             <a:fld id="{90A1AF40-B069-4308-AE37-059D9D6205A9}" type="datetimeFigureOut">
               <a:rPr lang="en-IN" smtClean="0"/>
-              <a:t>13-10-2024</a:t>
+              <a:t>26-02-2025</a:t>
             </a:fld>
             <a:endParaRPr lang="en-IN"/>
           </a:p>
@@ -3115,7 +2203,7 @@
           <a:p>
             <a:fld id="{90A1AF40-B069-4308-AE37-059D9D6205A9}" type="datetimeFigureOut">
               <a:rPr lang="en-IN" smtClean="0"/>
-              <a:t>13-10-2024</a:t>
+              <a:t>26-02-2025</a:t>
             </a:fld>
             <a:endParaRPr lang="en-IN"/>
           </a:p>
@@ -3428,7 +2516,7 @@
           <a:p>
             <a:fld id="{90A1AF40-B069-4308-AE37-059D9D6205A9}" type="datetimeFigureOut">
               <a:rPr lang="en-IN" smtClean="0"/>
-              <a:t>13-10-2024</a:t>
+              <a:t>26-02-2025</a:t>
             </a:fld>
             <a:endParaRPr lang="en-IN"/>
           </a:p>
@@ -3717,7 +2805,7 @@
           <a:p>
             <a:fld id="{90A1AF40-B069-4308-AE37-059D9D6205A9}" type="datetimeFigureOut">
               <a:rPr lang="en-IN" smtClean="0"/>
-              <a:t>13-10-2024</a:t>
+              <a:t>26-02-2025</a:t>
             </a:fld>
             <a:endParaRPr lang="en-IN"/>
           </a:p>
@@ -3960,7 +3048,7 @@
           <a:p>
             <a:fld id="{90A1AF40-B069-4308-AE37-059D9D6205A9}" type="datetimeFigureOut">
               <a:rPr lang="en-IN" smtClean="0"/>
-              <a:t>13-10-2024</a:t>
+              <a:t>26-02-2025</a:t>
             </a:fld>
             <a:endParaRPr lang="en-IN"/>
           </a:p>
@@ -7899,6 +6987,16 @@
               <a:buChar char="§"/>
             </a:pPr>
             <a:r>
+              <a:rPr lang="en-IN" sz="2000" dirty="0" err="1">
+                <a:solidFill>
+                  <a:schemeClr val="bg1"/>
+                </a:solidFill>
+                <a:latin typeface="Nunito SemiBold" pitchFamily="2" charset="0"/>
+                <a:cs typeface="Baloo" panose="03080902040302020200" pitchFamily="66" charset="0"/>
+              </a:rPr>
+              <a:t>Shriyansh</a:t>
+            </a:r>
+            <a:r>
               <a:rPr lang="en-IN" sz="2000" dirty="0">
                 <a:solidFill>
                   <a:schemeClr val="bg1"/>
@@ -7906,7 +7004,7 @@
                 <a:latin typeface="Nunito SemiBold" pitchFamily="2" charset="0"/>
                 <a:cs typeface="Baloo" panose="03080902040302020200" pitchFamily="66" charset="0"/>
               </a:rPr>
-              <a:t>Nishith Narendra Mehta </a:t>
+              <a:t> Akash Jain </a:t>
             </a:r>
             <a:r>
               <a:rPr lang="en-US" sz="2000" dirty="0">
@@ -7916,7 +7014,7 @@
                 <a:latin typeface="Nunito SemiBold" pitchFamily="2" charset="0"/>
                 <a:cs typeface="Baloo" panose="03080902040302020200" pitchFamily="66" charset="0"/>
               </a:rPr>
-              <a:t>[2204030102026]</a:t>
+              <a:t>[2204030100404]</a:t>
             </a:r>
             <a:endParaRPr lang="en-IN" sz="2000" dirty="0">
               <a:solidFill>

</xml_diff>